<commit_message>
Ajustes sobre la presentación y el readme.md
</commit_message>
<xml_diff>
--- a/ppt/curso-devops-ultpgc.pptx
+++ b/ppt/curso-devops-ultpgc.pptx
@@ -40,7 +40,7 @@
       <p:boldItalic r:id="rId15"/>
     </p:embeddedFont>
     <p:embeddedFont>
-      <p:font typeface="Ramabhadra" panose="020B0604020202020204" charset="0"/>
+      <p:font typeface="Ramabhadra"/>
       <p:regular r:id="rId15"/>
     </p:embeddedFont>
   </p:embeddedFontLst>
@@ -10170,6 +10170,147 @@
           </a:p>
         </p:txBody>
       </p:sp>
+      <p:pic>
+        <p:nvPicPr>
+          <p:cNvPr id="2" name="Picture 2">
+            <a:extLst>
+              <a:ext uri="{FF2B5EF4-FFF2-40B4-BE49-F238E27FC236}">
+                <a16:creationId xmlns:a16="http://schemas.microsoft.com/office/drawing/2014/main" id="{31D717A1-814E-3180-ABA6-7D9498638E01}"/>
+              </a:ext>
+            </a:extLst>
+          </p:cNvPr>
+          <p:cNvPicPr>
+            <a:picLocks noChangeAspect="1" noChangeArrowheads="1"/>
+          </p:cNvPicPr>
+          <p:nvPr/>
+        </p:nvPicPr>
+        <p:blipFill>
+          <a:blip r:embed="rId4">
+            <a:extLst>
+              <a:ext uri="{28A0092B-C50C-407E-A947-70E740481C1C}">
+                <a14:useLocalDpi xmlns:a14="http://schemas.microsoft.com/office/drawing/2010/main" val="0"/>
+              </a:ext>
+            </a:extLst>
+          </a:blip>
+          <a:srcRect/>
+          <a:stretch>
+            <a:fillRect/>
+          </a:stretch>
+        </p:blipFill>
+        <p:spPr bwMode="auto">
+          <a:xfrm>
+            <a:off x="6808404" y="2363516"/>
+            <a:ext cx="1371734" cy="540264"/>
+          </a:xfrm>
+          <a:prstGeom prst="rect">
+            <a:avLst/>
+          </a:prstGeom>
+          <a:noFill/>
+          <a:extLst>
+            <a:ext uri="{909E8E84-426E-40DD-AFC4-6F175D3DCCD1}">
+              <a14:hiddenFill xmlns:a14="http://schemas.microsoft.com/office/drawing/2010/main">
+                <a:solidFill>
+                  <a:srgbClr val="FFFFFF"/>
+                </a:solidFill>
+              </a14:hiddenFill>
+            </a:ext>
+          </a:extLst>
+        </p:spPr>
+      </p:pic>
+      <p:pic>
+        <p:nvPicPr>
+          <p:cNvPr id="1028" name="Picture 4" descr="Store | GitKraken">
+            <a:extLst>
+              <a:ext uri="{FF2B5EF4-FFF2-40B4-BE49-F238E27FC236}">
+                <a16:creationId xmlns:a16="http://schemas.microsoft.com/office/drawing/2014/main" id="{ED2692B1-A7AF-0DB2-8BF3-7A939D230900}"/>
+              </a:ext>
+            </a:extLst>
+          </p:cNvPr>
+          <p:cNvPicPr>
+            <a:picLocks noChangeAspect="1" noChangeArrowheads="1"/>
+          </p:cNvPicPr>
+          <p:nvPr/>
+        </p:nvPicPr>
+        <p:blipFill>
+          <a:blip r:embed="rId5">
+            <a:extLst>
+              <a:ext uri="{28A0092B-C50C-407E-A947-70E740481C1C}">
+                <a14:useLocalDpi xmlns:a14="http://schemas.microsoft.com/office/drawing/2010/main" val="0"/>
+              </a:ext>
+            </a:extLst>
+          </a:blip>
+          <a:srcRect/>
+          <a:stretch>
+            <a:fillRect/>
+          </a:stretch>
+        </p:blipFill>
+        <p:spPr bwMode="auto">
+          <a:xfrm>
+            <a:off x="6726557" y="2040128"/>
+            <a:ext cx="1496737" cy="392634"/>
+          </a:xfrm>
+          <a:prstGeom prst="rect">
+            <a:avLst/>
+          </a:prstGeom>
+          <a:noFill/>
+          <a:extLst>
+            <a:ext uri="{909E8E84-426E-40DD-AFC4-6F175D3DCCD1}">
+              <a14:hiddenFill xmlns:a14="http://schemas.microsoft.com/office/drawing/2010/main">
+                <a:solidFill>
+                  <a:srgbClr val="FFFFFF"/>
+                </a:solidFill>
+              </a14:hiddenFill>
+            </a:ext>
+          </a:extLst>
+        </p:spPr>
+      </p:pic>
+      <p:pic>
+        <p:nvPicPr>
+          <p:cNvPr id="1030" name="Picture 6">
+            <a:extLst>
+              <a:ext uri="{FF2B5EF4-FFF2-40B4-BE49-F238E27FC236}">
+                <a16:creationId xmlns:a16="http://schemas.microsoft.com/office/drawing/2014/main" id="{F09FC758-3D88-F173-977D-A9656D19427B}"/>
+              </a:ext>
+            </a:extLst>
+          </p:cNvPr>
+          <p:cNvPicPr>
+            <a:picLocks noChangeAspect="1" noChangeArrowheads="1"/>
+          </p:cNvPicPr>
+          <p:nvPr/>
+        </p:nvPicPr>
+        <p:blipFill>
+          <a:blip r:embed="rId6">
+            <a:extLst>
+              <a:ext uri="{28A0092B-C50C-407E-A947-70E740481C1C}">
+                <a14:useLocalDpi xmlns:a14="http://schemas.microsoft.com/office/drawing/2010/main" val="0"/>
+              </a:ext>
+            </a:extLst>
+          </a:blip>
+          <a:srcRect/>
+          <a:stretch>
+            <a:fillRect/>
+          </a:stretch>
+        </p:blipFill>
+        <p:spPr bwMode="auto">
+          <a:xfrm>
+            <a:off x="7183313" y="2957143"/>
+            <a:ext cx="648059" cy="270025"/>
+          </a:xfrm>
+          <a:prstGeom prst="rect">
+            <a:avLst/>
+          </a:prstGeom>
+          <a:noFill/>
+          <a:extLst>
+            <a:ext uri="{909E8E84-426E-40DD-AFC4-6F175D3DCCD1}">
+              <a14:hiddenFill xmlns:a14="http://schemas.microsoft.com/office/drawing/2010/main">
+                <a:solidFill>
+                  <a:srgbClr val="FFFFFF"/>
+                </a:solidFill>
+              </a14:hiddenFill>
+            </a:ext>
+          </a:extLst>
+        </p:spPr>
+      </p:pic>
     </p:spTree>
     <p:extLst>
       <p:ext uri="{BB962C8B-B14F-4D97-AF65-F5344CB8AC3E}">
@@ -10255,7 +10396,7 @@
         </p:nvSpPr>
         <p:spPr>
           <a:xfrm>
-            <a:off x="1471258" y="3841436"/>
+            <a:off x="1471257" y="3154196"/>
             <a:ext cx="5955175" cy="1015663"/>
           </a:xfrm>
           <a:prstGeom prst="rect">
@@ -10341,8 +10482,8 @@
         </p:blipFill>
         <p:spPr bwMode="auto">
           <a:xfrm>
-            <a:off x="2877471" y="752933"/>
-            <a:ext cx="3389057" cy="2803304"/>
+            <a:off x="3218344" y="858846"/>
+            <a:ext cx="2482468" cy="2053406"/>
           </a:xfrm>
           <a:prstGeom prst="rect">
             <a:avLst/>
@@ -10359,6 +10500,57 @@
           </a:extLst>
         </p:spPr>
       </p:pic>
+      <p:sp>
+        <p:nvSpPr>
+          <p:cNvPr id="3" name="CuadroTexto 2">
+            <a:extLst>
+              <a:ext uri="{FF2B5EF4-FFF2-40B4-BE49-F238E27FC236}">
+                <a16:creationId xmlns:a16="http://schemas.microsoft.com/office/drawing/2014/main" id="{9C19A34D-47D1-9CE3-411D-531604E670ED}"/>
+              </a:ext>
+            </a:extLst>
+          </p:cNvPr>
+          <p:cNvSpPr txBox="1"/>
+          <p:nvPr/>
+        </p:nvSpPr>
+        <p:spPr>
+          <a:xfrm>
+            <a:off x="2207962" y="4339331"/>
+            <a:ext cx="4652404" cy="738664"/>
+          </a:xfrm>
+          <a:prstGeom prst="rect">
+            <a:avLst/>
+          </a:prstGeom>
+          <a:noFill/>
+        </p:spPr>
+        <p:txBody>
+          <a:bodyPr wrap="square">
+            <a:spAutoFit/>
+          </a:bodyPr>
+          <a:lstStyle/>
+          <a:p>
+            <a:r>
+              <a:rPr lang="es-ES" dirty="0">
+                <a:hlinkClick r:id="rId4"/>
+              </a:rPr>
+              <a:t>http://localhost:8080/openapi/swagger-ui/index.html</a:t>
+            </a:r>
+            <a:endParaRPr lang="es-ES" dirty="0"/>
+          </a:p>
+          <a:p>
+            <a:pPr algn="ctr"/>
+            <a:r>
+              <a:rPr lang="es-ES" dirty="0">
+                <a:hlinkClick r:id="rId5"/>
+              </a:rPr>
+              <a:t>http://localhost/reviews</a:t>
+            </a:r>
+            <a:endParaRPr lang="es-ES" dirty="0"/>
+          </a:p>
+          <a:p>
+            <a:endParaRPr lang="es-ES" dirty="0"/>
+          </a:p>
+        </p:txBody>
+      </p:sp>
     </p:spTree>
     <p:extLst>
       <p:ext uri="{BB962C8B-B14F-4D97-AF65-F5344CB8AC3E}">
@@ -10484,7 +10676,7 @@
         </p:nvSpPr>
         <p:spPr>
           <a:xfrm>
-            <a:off x="-123825" y="1627601"/>
+            <a:off x="-4011" y="1627601"/>
             <a:ext cx="4323014" cy="1846000"/>
           </a:xfrm>
           <a:prstGeom prst="rect">
@@ -13937,26 +14129,6 @@
 </file>
 
 <file path=customXml/item1.xml><?xml version="1.0" encoding="utf-8"?>
-<p:properties xmlns:p="http://schemas.microsoft.com/office/2006/metadata/properties" xmlns:xsi="http://www.w3.org/2001/XMLSchema-instance" xmlns:pc="http://schemas.microsoft.com/office/infopath/2007/PartnerControls">
-  <documentManagement>
-    <TaxCatchAll xmlns="435026e9-b5d0-4467-bbd9-3b76a09ae0c4" xsi:nil="true"/>
-    <lcf76f155ced4ddcb4097134ff3c332f xmlns="e202ecef-a3f6-4d98-ad9b-1b77cdb87b84">
-      <Terms xmlns="http://schemas.microsoft.com/office/infopath/2007/PartnerControls"/>
-    </lcf76f155ced4ddcb4097134ff3c332f>
-  </documentManagement>
-</p:properties>
-</file>
-
-<file path=customXml/item2.xml><?xml version="1.0" encoding="utf-8"?>
-<?mso-contentType ?>
-<FormTemplates xmlns="http://schemas.microsoft.com/sharepoint/v3/contenttype/forms">
-  <Display>DocumentLibraryForm</Display>
-  <Edit>DocumentLibraryForm</Edit>
-  <New>DocumentLibraryForm</New>
-</FormTemplates>
-</file>
-
-<file path=customXml/item3.xml><?xml version="1.0" encoding="utf-8"?>
 <ct:contentTypeSchema xmlns:ct="http://schemas.microsoft.com/office/2006/metadata/contentType" xmlns:ma="http://schemas.microsoft.com/office/2006/metadata/properties/metaAttributes" ct:_="" ma:_="" ma:contentTypeName="Documento" ma:contentTypeID="0x0101006B1E11B541137C48AA3727DCBBA54C16" ma:contentTypeVersion="11" ma:contentTypeDescription="Crear nuevo documento." ma:contentTypeScope="" ma:versionID="95949c5f839407ce12e4e96351584624">
   <xsd:schema xmlns:xsd="http://www.w3.org/2001/XMLSchema" xmlns:xs="http://www.w3.org/2001/XMLSchema" xmlns:p="http://schemas.microsoft.com/office/2006/metadata/properties" xmlns:ns2="e202ecef-a3f6-4d98-ad9b-1b77cdb87b84" xmlns:ns3="435026e9-b5d0-4467-bbd9-3b76a09ae0c4" targetNamespace="http://schemas.microsoft.com/office/2006/metadata/properties" ma:root="true" ma:fieldsID="f348301bcb62330657a04a353e23fd75" ns2:_="" ns3:_="">
     <xsd:import namespace="e202ecef-a3f6-4d98-ad9b-1b77cdb87b84"/>
@@ -14151,26 +14323,27 @@
 </ct:contentTypeSchema>
 </file>
 
-<file path=customXml/itemProps1.xml><?xml version="1.0" encoding="utf-8"?>
-<ds:datastoreItem xmlns:ds="http://schemas.openxmlformats.org/officeDocument/2006/customXml" ds:itemID="{2F6D6B62-92C6-4EDE-B50E-8B81CFF669EA}">
-  <ds:schemaRefs>
-    <ds:schemaRef ds:uri="http://schemas.microsoft.com/office/2006/metadata/properties"/>
-    <ds:schemaRef ds:uri="http://schemas.microsoft.com/office/infopath/2007/PartnerControls"/>
-    <ds:schemaRef ds:uri="435026e9-b5d0-4467-bbd9-3b76a09ae0c4"/>
-    <ds:schemaRef ds:uri="e202ecef-a3f6-4d98-ad9b-1b77cdb87b84"/>
-  </ds:schemaRefs>
-</ds:datastoreItem>
+<file path=customXml/item2.xml><?xml version="1.0" encoding="utf-8"?>
+<?mso-contentType ?>
+<FormTemplates xmlns="http://schemas.microsoft.com/sharepoint/v3/contenttype/forms">
+  <Display>DocumentLibraryForm</Display>
+  <Edit>DocumentLibraryForm</Edit>
+  <New>DocumentLibraryForm</New>
+</FormTemplates>
 </file>
 
-<file path=customXml/itemProps2.xml><?xml version="1.0" encoding="utf-8"?>
-<ds:datastoreItem xmlns:ds="http://schemas.openxmlformats.org/officeDocument/2006/customXml" ds:itemID="{A4B54BEA-998E-408D-BCCD-09BA67DF44CE}">
-  <ds:schemaRefs>
-    <ds:schemaRef ds:uri="http://schemas.microsoft.com/sharepoint/v3/contenttype/forms"/>
-  </ds:schemaRefs>
-</ds:datastoreItem>
+<file path=customXml/item3.xml><?xml version="1.0" encoding="utf-8"?>
+<p:properties xmlns:p="http://schemas.microsoft.com/office/2006/metadata/properties" xmlns:xsi="http://www.w3.org/2001/XMLSchema-instance" xmlns:pc="http://schemas.microsoft.com/office/infopath/2007/PartnerControls">
+  <documentManagement>
+    <TaxCatchAll xmlns="435026e9-b5d0-4467-bbd9-3b76a09ae0c4" xsi:nil="true"/>
+    <lcf76f155ced4ddcb4097134ff3c332f xmlns="e202ecef-a3f6-4d98-ad9b-1b77cdb87b84">
+      <Terms xmlns="http://schemas.microsoft.com/office/infopath/2007/PartnerControls"/>
+    </lcf76f155ced4ddcb4097134ff3c332f>
+  </documentManagement>
+</p:properties>
 </file>
 
-<file path=customXml/itemProps3.xml><?xml version="1.0" encoding="utf-8"?>
+<file path=customXml/itemProps1.xml><?xml version="1.0" encoding="utf-8"?>
 <ds:datastoreItem xmlns:ds="http://schemas.openxmlformats.org/officeDocument/2006/customXml" ds:itemID="{592DADBC-4920-4373-95D3-1A0ABF3667A7}">
   <ds:schemaRefs>
     <ds:schemaRef ds:uri="http://schemas.microsoft.com/office/2006/metadata/contentType"/>
@@ -14187,4 +14360,23 @@
     <ds:schemaRef ds:uri="http://schemas.microsoft.com/internal/obd"/>
   </ds:schemaRefs>
 </ds:datastoreItem>
+</file>
+
+<file path=customXml/itemProps2.xml><?xml version="1.0" encoding="utf-8"?>
+<ds:datastoreItem xmlns:ds="http://schemas.openxmlformats.org/officeDocument/2006/customXml" ds:itemID="{A4B54BEA-998E-408D-BCCD-09BA67DF44CE}">
+  <ds:schemaRefs>
+    <ds:schemaRef ds:uri="http://schemas.microsoft.com/sharepoint/v3/contenttype/forms"/>
+  </ds:schemaRefs>
+</ds:datastoreItem>
+</file>
+
+<file path=customXml/itemProps3.xml><?xml version="1.0" encoding="utf-8"?>
+<ds:datastoreItem xmlns:ds="http://schemas.openxmlformats.org/officeDocument/2006/customXml" ds:itemID="{2F6D6B62-92C6-4EDE-B50E-8B81CFF669EA}">
+  <ds:schemaRefs>
+    <ds:schemaRef ds:uri="http://schemas.microsoft.com/office/2006/metadata/properties"/>
+    <ds:schemaRef ds:uri="http://schemas.microsoft.com/office/infopath/2007/PartnerControls"/>
+    <ds:schemaRef ds:uri="435026e9-b5d0-4467-bbd9-3b76a09ae0c4"/>
+    <ds:schemaRef ds:uri="e202ecef-a3f6-4d98-ad9b-1b77cdb87b84"/>
+  </ds:schemaRefs>
+</ds:datastoreItem>
 </file>
</xml_diff>